<commit_message>
Add Labeling output reset
</commit_message>
<xml_diff>
--- a/Structure.pptx
+++ b/Structure.pptx
@@ -6,7 +6,8 @@
   </p:sldMasterIdLst>
   <p:sldIdLst>
     <p:sldId id="257" r:id="rId2"/>
-    <p:sldId id="258" r:id="rId3"/>
+    <p:sldId id="259" r:id="rId3"/>
+    <p:sldId id="258" r:id="rId4"/>
   </p:sldIdLst>
   <p:sldSz cx="12192000" cy="6858000"/>
   <p:notesSz cx="6858000" cy="9144000"/>
@@ -244,7 +245,7 @@
           <a:p>
             <a:fld id="{48CF60FA-5391-42A7-ADB2-B9CD4F97321A}" type="datetimeFigureOut">
               <a:rPr lang="nl-NL" smtClean="0"/>
-              <a:t>12-9-2017</a:t>
+              <a:t>13-9-2017</a:t>
             </a:fld>
             <a:endParaRPr lang="nl-NL"/>
           </a:p>
@@ -414,7 +415,7 @@
           <a:p>
             <a:fld id="{48CF60FA-5391-42A7-ADB2-B9CD4F97321A}" type="datetimeFigureOut">
               <a:rPr lang="nl-NL" smtClean="0"/>
-              <a:t>12-9-2017</a:t>
+              <a:t>13-9-2017</a:t>
             </a:fld>
             <a:endParaRPr lang="nl-NL"/>
           </a:p>
@@ -594,7 +595,7 @@
           <a:p>
             <a:fld id="{48CF60FA-5391-42A7-ADB2-B9CD4F97321A}" type="datetimeFigureOut">
               <a:rPr lang="nl-NL" smtClean="0"/>
-              <a:t>12-9-2017</a:t>
+              <a:t>13-9-2017</a:t>
             </a:fld>
             <a:endParaRPr lang="nl-NL"/>
           </a:p>
@@ -764,7 +765,7 @@
           <a:p>
             <a:fld id="{48CF60FA-5391-42A7-ADB2-B9CD4F97321A}" type="datetimeFigureOut">
               <a:rPr lang="nl-NL" smtClean="0"/>
-              <a:t>12-9-2017</a:t>
+              <a:t>13-9-2017</a:t>
             </a:fld>
             <a:endParaRPr lang="nl-NL"/>
           </a:p>
@@ -1010,7 +1011,7 @@
           <a:p>
             <a:fld id="{48CF60FA-5391-42A7-ADB2-B9CD4F97321A}" type="datetimeFigureOut">
               <a:rPr lang="nl-NL" smtClean="0"/>
-              <a:t>12-9-2017</a:t>
+              <a:t>13-9-2017</a:t>
             </a:fld>
             <a:endParaRPr lang="nl-NL"/>
           </a:p>
@@ -1242,7 +1243,7 @@
           <a:p>
             <a:fld id="{48CF60FA-5391-42A7-ADB2-B9CD4F97321A}" type="datetimeFigureOut">
               <a:rPr lang="nl-NL" smtClean="0"/>
-              <a:t>12-9-2017</a:t>
+              <a:t>13-9-2017</a:t>
             </a:fld>
             <a:endParaRPr lang="nl-NL"/>
           </a:p>
@@ -1609,7 +1610,7 @@
           <a:p>
             <a:fld id="{48CF60FA-5391-42A7-ADB2-B9CD4F97321A}" type="datetimeFigureOut">
               <a:rPr lang="nl-NL" smtClean="0"/>
-              <a:t>12-9-2017</a:t>
+              <a:t>13-9-2017</a:t>
             </a:fld>
             <a:endParaRPr lang="nl-NL"/>
           </a:p>
@@ -1727,7 +1728,7 @@
           <a:p>
             <a:fld id="{48CF60FA-5391-42A7-ADB2-B9CD4F97321A}" type="datetimeFigureOut">
               <a:rPr lang="nl-NL" smtClean="0"/>
-              <a:t>12-9-2017</a:t>
+              <a:t>13-9-2017</a:t>
             </a:fld>
             <a:endParaRPr lang="nl-NL"/>
           </a:p>
@@ -1822,7 +1823,7 @@
           <a:p>
             <a:fld id="{48CF60FA-5391-42A7-ADB2-B9CD4F97321A}" type="datetimeFigureOut">
               <a:rPr lang="nl-NL" smtClean="0"/>
-              <a:t>12-9-2017</a:t>
+              <a:t>13-9-2017</a:t>
             </a:fld>
             <a:endParaRPr lang="nl-NL"/>
           </a:p>
@@ -2099,7 +2100,7 @@
           <a:p>
             <a:fld id="{48CF60FA-5391-42A7-ADB2-B9CD4F97321A}" type="datetimeFigureOut">
               <a:rPr lang="nl-NL" smtClean="0"/>
-              <a:t>12-9-2017</a:t>
+              <a:t>13-9-2017</a:t>
             </a:fld>
             <a:endParaRPr lang="nl-NL"/>
           </a:p>
@@ -2352,7 +2353,7 @@
           <a:p>
             <a:fld id="{48CF60FA-5391-42A7-ADB2-B9CD4F97321A}" type="datetimeFigureOut">
               <a:rPr lang="nl-NL" smtClean="0"/>
-              <a:t>12-9-2017</a:t>
+              <a:t>13-9-2017</a:t>
             </a:fld>
             <a:endParaRPr lang="nl-NL"/>
           </a:p>
@@ -2565,7 +2566,7 @@
           <a:p>
             <a:fld id="{48CF60FA-5391-42A7-ADB2-B9CD4F97321A}" type="datetimeFigureOut">
               <a:rPr lang="nl-NL" smtClean="0"/>
-              <a:t>12-9-2017</a:t>
+              <a:t>13-9-2017</a:t>
             </a:fld>
             <a:endParaRPr lang="nl-NL"/>
           </a:p>
@@ -3491,7 +3492,7 @@
         </p:nvSpPr>
         <p:spPr>
           <a:xfrm>
-            <a:off x="9584489" y="718458"/>
+            <a:off x="8863391" y="622430"/>
             <a:ext cx="1976139" cy="959685"/>
           </a:xfrm>
           <a:prstGeom prst="ellipse">
@@ -3521,7 +3522,11 @@
             <a:pPr algn="ctr"/>
             <a:r>
               <a:rPr lang="nl-NL" dirty="0" smtClean="0"/>
-              <a:t>Start labeler</a:t>
+              <a:t>Start labeler </a:t>
+            </a:r>
+            <a:r>
+              <a:rPr lang="nl-NL" altLang="zh-CN" dirty="0" smtClean="0"/>
+              <a:t>Software</a:t>
             </a:r>
             <a:endParaRPr lang="nl-NL" dirty="0"/>
           </a:p>
@@ -3532,14 +3537,14 @@
           <p:cNvPr id="25" name="Straight Arrow Connector 24"/>
           <p:cNvCxnSpPr>
             <a:stCxn id="14" idx="7"/>
-            <a:endCxn id="23" idx="4"/>
+            <a:endCxn id="23" idx="3"/>
           </p:cNvCxnSpPr>
           <p:nvPr/>
         </p:nvCxnSpPr>
         <p:spPr>
           <a:xfrm flipV="1">
-            <a:off x="1717571" y="1678143"/>
-            <a:ext cx="8854988" cy="1889800"/>
+            <a:off x="1717571" y="1441572"/>
+            <a:ext cx="7435219" cy="2126371"/>
           </a:xfrm>
           <a:prstGeom prst="straightConnector1">
             <a:avLst/>
@@ -3574,8 +3579,8 @@
         </p:nvCxnSpPr>
         <p:spPr>
           <a:xfrm flipV="1">
-            <a:off x="4478313" y="1678143"/>
-            <a:ext cx="6094246" cy="2066420"/>
+            <a:off x="4478313" y="1582115"/>
+            <a:ext cx="5373148" cy="2162448"/>
           </a:xfrm>
           <a:prstGeom prst="straightConnector1">
             <a:avLst/>
@@ -3658,7 +3663,7 @@
         </p:nvSpPr>
         <p:spPr>
           <a:xfrm>
-            <a:off x="10628685" y="2674948"/>
+            <a:off x="10492171" y="2419611"/>
             <a:ext cx="1567543" cy="838034"/>
           </a:xfrm>
           <a:prstGeom prst="ellipse">
@@ -3712,8 +3717,8 @@
         </p:nvCxnSpPr>
         <p:spPr>
           <a:xfrm flipH="1">
-            <a:off x="9438397" y="1678143"/>
-            <a:ext cx="1134162" cy="741468"/>
+            <a:off x="9438397" y="1582115"/>
+            <a:ext cx="413064" cy="837496"/>
           </a:xfrm>
           <a:prstGeom prst="straightConnector1">
             <a:avLst/>
@@ -3741,15 +3746,15 @@
         <p:nvCxnSpPr>
           <p:cNvPr id="64" name="Straight Arrow Connector 63"/>
           <p:cNvCxnSpPr>
-            <a:stCxn id="23" idx="4"/>
+            <a:stCxn id="23" idx="5"/>
             <a:endCxn id="60" idx="0"/>
           </p:cNvCxnSpPr>
           <p:nvPr/>
         </p:nvCxnSpPr>
         <p:spPr>
           <a:xfrm>
-            <a:off x="10572559" y="1678143"/>
-            <a:ext cx="839898" cy="996805"/>
+            <a:off x="10550131" y="1441572"/>
+            <a:ext cx="725812" cy="978039"/>
           </a:xfrm>
           <a:prstGeom prst="straightConnector1">
             <a:avLst/>
@@ -3861,7 +3866,7 @@
         </p:nvSpPr>
         <p:spPr>
           <a:xfrm>
-            <a:off x="9756032" y="5545481"/>
+            <a:off x="7760290" y="5962388"/>
             <a:ext cx="2261317" cy="876853"/>
           </a:xfrm>
           <a:prstGeom prst="ellipse">
@@ -3911,15 +3916,15 @@
         <p:nvCxnSpPr>
           <p:cNvPr id="74" name="Straight Arrow Connector 73"/>
           <p:cNvCxnSpPr>
-            <a:stCxn id="69" idx="4"/>
+            <a:stCxn id="49" idx="3"/>
             <a:endCxn id="72" idx="0"/>
           </p:cNvCxnSpPr>
           <p:nvPr/>
         </p:nvCxnSpPr>
         <p:spPr>
-          <a:xfrm>
-            <a:off x="10466230" y="4633058"/>
-            <a:ext cx="420461" cy="912423"/>
+          <a:xfrm flipH="1">
+            <a:off x="8890949" y="5542962"/>
+            <a:ext cx="372992" cy="419426"/>
           </a:xfrm>
           <a:prstGeom prst="straightConnector1">
             <a:avLst/>
@@ -3951,8 +3956,8 @@
         </p:nvSpPr>
         <p:spPr>
           <a:xfrm>
-            <a:off x="8523515" y="4874272"/>
-            <a:ext cx="1893593" cy="788009"/>
+            <a:off x="10222168" y="6061902"/>
+            <a:ext cx="1899778" cy="764851"/>
           </a:xfrm>
           <a:prstGeom prst="ellipse">
             <a:avLst/>
@@ -4003,15 +4008,15 @@
         <p:nvCxnSpPr>
           <p:cNvPr id="78" name="Straight Arrow Connector 77"/>
           <p:cNvCxnSpPr>
-            <a:stCxn id="69" idx="4"/>
-            <a:endCxn id="76" idx="0"/>
+            <a:stCxn id="69" idx="3"/>
+            <a:endCxn id="49" idx="0"/>
           </p:cNvCxnSpPr>
           <p:nvPr/>
         </p:nvCxnSpPr>
         <p:spPr>
           <a:xfrm flipH="1">
-            <a:off x="9470312" y="4633058"/>
-            <a:ext cx="995918" cy="241214"/>
+            <a:off x="9754908" y="4514354"/>
+            <a:ext cx="209136" cy="455696"/>
           </a:xfrm>
           <a:prstGeom prst="straightConnector1">
             <a:avLst/>
@@ -4043,7 +4048,7 @@
         </p:nvSpPr>
         <p:spPr>
           <a:xfrm>
-            <a:off x="5744320" y="756754"/>
+            <a:off x="5471539" y="250329"/>
             <a:ext cx="1949989" cy="927503"/>
           </a:xfrm>
           <a:prstGeom prst="ellipse">
@@ -4090,15 +4095,15 @@
         <p:nvCxnSpPr>
           <p:cNvPr id="97" name="Straight Arrow Connector 96"/>
           <p:cNvCxnSpPr>
-            <a:stCxn id="23" idx="2"/>
-            <a:endCxn id="79" idx="6"/>
+            <a:stCxn id="6" idx="6"/>
+            <a:endCxn id="23" idx="2"/>
           </p:cNvCxnSpPr>
           <p:nvPr/>
         </p:nvCxnSpPr>
         <p:spPr>
-          <a:xfrm flipH="1">
-            <a:off x="7694309" y="1198301"/>
-            <a:ext cx="1890180" cy="22205"/>
+          <a:xfrm flipV="1">
+            <a:off x="4702629" y="1102273"/>
+            <a:ext cx="4160762" cy="1105349"/>
           </a:xfrm>
           <a:prstGeom prst="straightConnector1">
             <a:avLst/>
@@ -4126,15 +4131,15 @@
         <p:nvCxnSpPr>
           <p:cNvPr id="108" name="Straight Arrow Connector 107"/>
           <p:cNvCxnSpPr>
-            <a:stCxn id="6" idx="6"/>
+            <a:stCxn id="6" idx="7"/>
             <a:endCxn id="79" idx="3"/>
           </p:cNvCxnSpPr>
           <p:nvPr/>
         </p:nvCxnSpPr>
         <p:spPr>
           <a:xfrm flipV="1">
-            <a:off x="4702629" y="1548427"/>
-            <a:ext cx="1327260" cy="659195"/>
+            <a:off x="4413824" y="1042002"/>
+            <a:ext cx="1343284" cy="906989"/>
           </a:xfrm>
           <a:prstGeom prst="straightConnector1">
             <a:avLst/>
@@ -4335,15 +4340,173 @@
         <p:nvCxnSpPr>
           <p:cNvPr id="150" name="Straight Arrow Connector 149"/>
           <p:cNvCxnSpPr>
-            <a:stCxn id="79" idx="4"/>
+            <a:stCxn id="79" idx="5"/>
             <a:endCxn id="119" idx="0"/>
           </p:cNvCxnSpPr>
           <p:nvPr/>
         </p:nvCxnSpPr>
         <p:spPr>
           <a:xfrm>
-            <a:off x="6719315" y="1684257"/>
-            <a:ext cx="1665307" cy="1952269"/>
+            <a:off x="7135959" y="1042002"/>
+            <a:ext cx="1248663" cy="2594524"/>
+          </a:xfrm>
+          <a:prstGeom prst="straightConnector1">
+            <a:avLst/>
+          </a:prstGeom>
+          <a:ln>
+            <a:tailEnd type="triangle"/>
+          </a:ln>
+        </p:spPr>
+        <p:style>
+          <a:lnRef idx="1">
+            <a:schemeClr val="accent1"/>
+          </a:lnRef>
+          <a:fillRef idx="0">
+            <a:schemeClr val="accent1"/>
+          </a:fillRef>
+          <a:effectRef idx="0">
+            <a:schemeClr val="accent1"/>
+          </a:effectRef>
+          <a:fontRef idx="minor">
+            <a:schemeClr val="tx1"/>
+          </a:fontRef>
+        </p:style>
+      </p:cxnSp>
+      <p:sp>
+        <p:nvSpPr>
+          <p:cNvPr id="29" name="Oval 28"/>
+          <p:cNvSpPr/>
+          <p:nvPr/>
+        </p:nvSpPr>
+        <p:spPr>
+          <a:xfrm>
+            <a:off x="10981294" y="4755869"/>
+            <a:ext cx="998110" cy="671208"/>
+          </a:xfrm>
+          <a:prstGeom prst="ellipse">
+            <a:avLst/>
+          </a:prstGeom>
+        </p:spPr>
+        <p:style>
+          <a:lnRef idx="2">
+            <a:schemeClr val="accent1">
+              <a:shade val="50000"/>
+            </a:schemeClr>
+          </a:lnRef>
+          <a:fillRef idx="1">
+            <a:schemeClr val="accent1"/>
+          </a:fillRef>
+          <a:effectRef idx="0">
+            <a:schemeClr val="accent1"/>
+          </a:effectRef>
+          <a:fontRef idx="minor">
+            <a:schemeClr val="lt1"/>
+          </a:fontRef>
+        </p:style>
+        <p:txBody>
+          <a:bodyPr rtlCol="0" anchor="ctr"/>
+          <a:lstStyle/>
+          <a:p>
+            <a:pPr algn="ctr"/>
+            <a:r>
+              <a:rPr lang="nl-NL" altLang="zh-CN" dirty="0" smtClean="0"/>
+              <a:t>vctrl</a:t>
+            </a:r>
+          </a:p>
+        </p:txBody>
+      </p:sp>
+      <p:sp>
+        <p:nvSpPr>
+          <p:cNvPr id="49" name="Oval 48"/>
+          <p:cNvSpPr/>
+          <p:nvPr/>
+        </p:nvSpPr>
+        <p:spPr>
+          <a:xfrm>
+            <a:off x="9060576" y="4970050"/>
+            <a:ext cx="1388664" cy="671208"/>
+          </a:xfrm>
+          <a:prstGeom prst="ellipse">
+            <a:avLst/>
+          </a:prstGeom>
+        </p:spPr>
+        <p:style>
+          <a:lnRef idx="2">
+            <a:schemeClr val="accent1">
+              <a:shade val="50000"/>
+            </a:schemeClr>
+          </a:lnRef>
+          <a:fillRef idx="1">
+            <a:schemeClr val="accent1"/>
+          </a:fillRef>
+          <a:effectRef idx="0">
+            <a:schemeClr val="accent1"/>
+          </a:effectRef>
+          <a:fontRef idx="minor">
+            <a:schemeClr val="lt1"/>
+          </a:fontRef>
+        </p:style>
+        <p:txBody>
+          <a:bodyPr rtlCol="0" anchor="ctr"/>
+          <a:lstStyle/>
+          <a:p>
+            <a:pPr algn="ctr"/>
+            <a:r>
+              <a:rPr lang="nl-NL" altLang="zh-CN" dirty="0" smtClean="0"/>
+              <a:t>vthread</a:t>
+            </a:r>
+          </a:p>
+        </p:txBody>
+      </p:sp>
+      <p:cxnSp>
+        <p:nvCxnSpPr>
+          <p:cNvPr id="55" name="Straight Arrow Connector 54"/>
+          <p:cNvCxnSpPr>
+            <a:stCxn id="29" idx="4"/>
+            <a:endCxn id="76" idx="0"/>
+          </p:cNvCxnSpPr>
+          <p:nvPr/>
+        </p:nvCxnSpPr>
+        <p:spPr>
+          <a:xfrm flipH="1">
+            <a:off x="11172057" y="5427077"/>
+            <a:ext cx="308292" cy="634825"/>
+          </a:xfrm>
+          <a:prstGeom prst="straightConnector1">
+            <a:avLst/>
+          </a:prstGeom>
+          <a:ln>
+            <a:tailEnd type="triangle"/>
+          </a:ln>
+        </p:spPr>
+        <p:style>
+          <a:lnRef idx="1">
+            <a:schemeClr val="accent1"/>
+          </a:lnRef>
+          <a:fillRef idx="0">
+            <a:schemeClr val="accent1"/>
+          </a:fillRef>
+          <a:effectRef idx="0">
+            <a:schemeClr val="accent1"/>
+          </a:effectRef>
+          <a:fontRef idx="minor">
+            <a:schemeClr val="tx1"/>
+          </a:fontRef>
+        </p:style>
+      </p:cxnSp>
+      <p:cxnSp>
+        <p:nvCxnSpPr>
+          <p:cNvPr id="58" name="Straight Arrow Connector 57"/>
+          <p:cNvCxnSpPr>
+            <a:stCxn id="49" idx="7"/>
+            <a:endCxn id="29" idx="2"/>
+          </p:cNvCxnSpPr>
+          <p:nvPr/>
+        </p:nvCxnSpPr>
+        <p:spPr>
+          <a:xfrm>
+            <a:off x="10245875" y="5068346"/>
+            <a:ext cx="735419" cy="23127"/>
           </a:xfrm>
           <a:prstGeom prst="straightConnector1">
             <a:avLst/>
@@ -4406,6 +4569,207 @@
       </p:grpSpPr>
       <p:sp>
         <p:nvSpPr>
+          <p:cNvPr id="4" name="Rectangle 3"/>
+          <p:cNvSpPr/>
+          <p:nvPr/>
+        </p:nvSpPr>
+        <p:spPr>
+          <a:xfrm>
+            <a:off x="408214" y="424543"/>
+            <a:ext cx="3282043" cy="1322614"/>
+          </a:xfrm>
+          <a:prstGeom prst="rect">
+            <a:avLst/>
+          </a:prstGeom>
+        </p:spPr>
+        <p:style>
+          <a:lnRef idx="2">
+            <a:schemeClr val="accent1">
+              <a:shade val="50000"/>
+            </a:schemeClr>
+          </a:lnRef>
+          <a:fillRef idx="1">
+            <a:schemeClr val="accent1"/>
+          </a:fillRef>
+          <a:effectRef idx="0">
+            <a:schemeClr val="accent1"/>
+          </a:effectRef>
+          <a:fontRef idx="minor">
+            <a:schemeClr val="lt1"/>
+          </a:fontRef>
+        </p:style>
+        <p:txBody>
+          <a:bodyPr rtlCol="0" anchor="ctr"/>
+          <a:lstStyle/>
+          <a:p>
+            <a:pPr algn="ctr"/>
+            <a:r>
+              <a:rPr lang="nl-NL" sz="2400" b="1" dirty="0" smtClean="0">
+                <a:solidFill>
+                  <a:srgbClr val="FFC000"/>
+                </a:solidFill>
+              </a:rPr>
+              <a:t>Process ctrl:</a:t>
+            </a:r>
+          </a:p>
+          <a:p>
+            <a:pPr algn="ctr"/>
+            <a:r>
+              <a:rPr lang="nl-NL" dirty="0" smtClean="0"/>
+              <a:t>Videowidget+this</a:t>
+            </a:r>
+            <a:r>
+              <a:rPr lang="nl-NL" dirty="0" smtClean="0">
+                <a:sym typeface="Wingdings" panose="05000000000000000000" pitchFamily="2" charset="2"/>
+              </a:rPr>
+              <a:t>LabelingProc</a:t>
+            </a:r>
+          </a:p>
+          <a:p>
+            <a:pPr algn="ctr"/>
+            <a:r>
+              <a:rPr lang="nl-NL" dirty="0" smtClean="0"/>
+              <a:t>Videowidget+this</a:t>
+            </a:r>
+            <a:r>
+              <a:rPr lang="nl-NL" dirty="0" smtClean="0">
+                <a:sym typeface="Wingdings" panose="05000000000000000000" pitchFamily="2" charset="2"/>
+              </a:rPr>
+              <a:t>labelingTask</a:t>
+            </a:r>
+            <a:endParaRPr lang="nl-NL" dirty="0"/>
+          </a:p>
+        </p:txBody>
+      </p:sp>
+      <p:sp>
+        <p:nvSpPr>
+          <p:cNvPr id="5" name="Rectangle 4"/>
+          <p:cNvSpPr/>
+          <p:nvPr/>
+        </p:nvSpPr>
+        <p:spPr>
+          <a:xfrm>
+            <a:off x="4425042" y="424543"/>
+            <a:ext cx="3445329" cy="1322614"/>
+          </a:xfrm>
+          <a:prstGeom prst="rect">
+            <a:avLst/>
+          </a:prstGeom>
+        </p:spPr>
+        <p:style>
+          <a:lnRef idx="2">
+            <a:schemeClr val="accent1">
+              <a:shade val="50000"/>
+            </a:schemeClr>
+          </a:lnRef>
+          <a:fillRef idx="1">
+            <a:schemeClr val="accent1"/>
+          </a:fillRef>
+          <a:effectRef idx="0">
+            <a:schemeClr val="accent1"/>
+          </a:effectRef>
+          <a:fontRef idx="minor">
+            <a:schemeClr val="lt1"/>
+          </a:fontRef>
+        </p:style>
+        <p:txBody>
+          <a:bodyPr rtlCol="0" anchor="ctr"/>
+          <a:lstStyle/>
+          <a:p>
+            <a:pPr algn="ctr"/>
+            <a:r>
+              <a:rPr lang="nl-NL" sz="2400" b="1" dirty="0">
+                <a:solidFill>
+                  <a:srgbClr val="FFC000"/>
+                </a:solidFill>
+              </a:rPr>
+              <a:t>LabelingTaskControl </a:t>
+            </a:r>
+            <a:r>
+              <a:rPr lang="nl-NL" sz="2400" b="1" dirty="0" smtClean="0">
+                <a:solidFill>
+                  <a:srgbClr val="FFC000"/>
+                </a:solidFill>
+              </a:rPr>
+              <a:t>:</a:t>
+            </a:r>
+          </a:p>
+          <a:p>
+            <a:pPr algn="ctr"/>
+            <a:r>
+              <a:rPr lang="nl-NL" dirty="0" smtClean="0"/>
+              <a:t>Surface+selection</a:t>
+            </a:r>
+            <a:r>
+              <a:rPr lang="nl-NL" dirty="0" smtClean="0">
+                <a:sym typeface="Wingdings" panose="05000000000000000000" pitchFamily="2" charset="2"/>
+              </a:rPr>
+              <a:t>changeColor</a:t>
+            </a:r>
+          </a:p>
+          <a:p>
+            <a:pPr algn="ctr"/>
+            <a:r>
+              <a:rPr lang="nl-NL" dirty="0" smtClean="0"/>
+              <a:t>Surface+Scroll</a:t>
+            </a:r>
+            <a:r>
+              <a:rPr lang="nl-NL" dirty="0" smtClean="0">
+                <a:sym typeface="Wingdings" panose="05000000000000000000" pitchFamily="2" charset="2"/>
+              </a:rPr>
+              <a:t>changeScroll</a:t>
+            </a:r>
+            <a:r>
+              <a:rPr lang="nl-NL" altLang="zh-CN" dirty="0" smtClean="0">
+                <a:sym typeface="Wingdings" panose="05000000000000000000" pitchFamily="2" charset="2"/>
+              </a:rPr>
+              <a:t>Pos</a:t>
+            </a:r>
+          </a:p>
+          <a:p>
+            <a:pPr algn="ctr"/>
+            <a:r>
+              <a:rPr lang="nl-NL" dirty="0" smtClean="0">
+                <a:sym typeface="Wingdings" panose="05000000000000000000" pitchFamily="2" charset="2"/>
+              </a:rPr>
+              <a:t>Surface+painterPathdrawImage</a:t>
+            </a:r>
+            <a:endParaRPr lang="nl-NL" dirty="0"/>
+          </a:p>
+        </p:txBody>
+      </p:sp>
+    </p:spTree>
+    <p:extLst>
+      <p:ext uri="{BB962C8B-B14F-4D97-AF65-F5344CB8AC3E}">
+        <p14:creationId xmlns:p14="http://schemas.microsoft.com/office/powerpoint/2010/main" val="2460821390"/>
+      </p:ext>
+    </p:extLst>
+  </p:cSld>
+  <p:clrMapOvr>
+    <a:masterClrMapping/>
+  </p:clrMapOvr>
+</p:sld>
+</file>
+
+<file path=ppt/slides/slide3.xml><?xml version="1.0" encoding="utf-8"?>
+<p:sld xmlns:a="http://schemas.openxmlformats.org/drawingml/2006/main" xmlns:r="http://schemas.openxmlformats.org/officeDocument/2006/relationships" xmlns:p="http://schemas.openxmlformats.org/presentationml/2006/main">
+  <p:cSld>
+    <p:spTree>
+      <p:nvGrpSpPr>
+        <p:cNvPr id="1" name=""/>
+        <p:cNvGrpSpPr/>
+        <p:nvPr/>
+      </p:nvGrpSpPr>
+      <p:grpSpPr>
+        <a:xfrm>
+          <a:off x="0" y="0"/>
+          <a:ext cx="0" cy="0"/>
+          <a:chOff x="0" y="0"/>
+          <a:chExt cx="0" cy="0"/>
+        </a:xfrm>
+      </p:grpSpPr>
+      <p:sp>
+        <p:nvSpPr>
           <p:cNvPr id="2" name="Title 1"/>
           <p:cNvSpPr>
             <a:spLocks noGrp="1"/>
@@ -4474,7 +4838,21 @@
           <a:p>
             <a:r>
               <a:rPr lang="en-US" dirty="0" smtClean="0"/>
-              <a:t>Left Right, for changing frame </a:t>
+              <a:t>Left Right, for changing </a:t>
+            </a:r>
+            <a:r>
+              <a:rPr lang="en-US" dirty="0" smtClean="0"/>
+              <a:t>frame</a:t>
+            </a:r>
+          </a:p>
+          <a:p>
+            <a:r>
+              <a:rPr lang="nl-NL" altLang="zh-CN" smtClean="0"/>
+              <a:t>R to reset</a:t>
+            </a:r>
+            <a:r>
+              <a:rPr lang="en-US" smtClean="0"/>
+              <a:t> </a:t>
             </a:r>
             <a:endParaRPr lang="nl-NL" dirty="0"/>
           </a:p>

</xml_diff>

<commit_message>
Add auto load result function to labeling
</commit_message>
<xml_diff>
--- a/Structure.pptx
+++ b/Structure.pptx
@@ -4847,11 +4847,11 @@
           </a:p>
           <a:p>
             <a:r>
-              <a:rPr lang="nl-NL" altLang="zh-CN" smtClean="0"/>
+              <a:rPr lang="nl-NL" altLang="zh-CN" dirty="0" smtClean="0"/>
               <a:t>R to reset</a:t>
             </a:r>
             <a:r>
-              <a:rPr lang="en-US" smtClean="0"/>
+              <a:rPr lang="en-US" dirty="0" smtClean="0"/>
               <a:t> </a:t>
             </a:r>
             <a:endParaRPr lang="nl-NL" dirty="0"/>

</xml_diff>

<commit_message>
Finish super pixel mousemove selection showing
</commit_message>
<xml_diff>
--- a/Structure.pptx
+++ b/Structure.pptx
@@ -245,7 +245,7 @@
           <a:p>
             <a:fld id="{48CF60FA-5391-42A7-ADB2-B9CD4F97321A}" type="datetimeFigureOut">
               <a:rPr lang="nl-NL" smtClean="0"/>
-              <a:t>13-9-2017</a:t>
+              <a:t>18-9-2017</a:t>
             </a:fld>
             <a:endParaRPr lang="nl-NL"/>
           </a:p>
@@ -415,7 +415,7 @@
           <a:p>
             <a:fld id="{48CF60FA-5391-42A7-ADB2-B9CD4F97321A}" type="datetimeFigureOut">
               <a:rPr lang="nl-NL" smtClean="0"/>
-              <a:t>13-9-2017</a:t>
+              <a:t>18-9-2017</a:t>
             </a:fld>
             <a:endParaRPr lang="nl-NL"/>
           </a:p>
@@ -595,7 +595,7 @@
           <a:p>
             <a:fld id="{48CF60FA-5391-42A7-ADB2-B9CD4F97321A}" type="datetimeFigureOut">
               <a:rPr lang="nl-NL" smtClean="0"/>
-              <a:t>13-9-2017</a:t>
+              <a:t>18-9-2017</a:t>
             </a:fld>
             <a:endParaRPr lang="nl-NL"/>
           </a:p>
@@ -765,7 +765,7 @@
           <a:p>
             <a:fld id="{48CF60FA-5391-42A7-ADB2-B9CD4F97321A}" type="datetimeFigureOut">
               <a:rPr lang="nl-NL" smtClean="0"/>
-              <a:t>13-9-2017</a:t>
+              <a:t>18-9-2017</a:t>
             </a:fld>
             <a:endParaRPr lang="nl-NL"/>
           </a:p>
@@ -1011,7 +1011,7 @@
           <a:p>
             <a:fld id="{48CF60FA-5391-42A7-ADB2-B9CD4F97321A}" type="datetimeFigureOut">
               <a:rPr lang="nl-NL" smtClean="0"/>
-              <a:t>13-9-2017</a:t>
+              <a:t>18-9-2017</a:t>
             </a:fld>
             <a:endParaRPr lang="nl-NL"/>
           </a:p>
@@ -1243,7 +1243,7 @@
           <a:p>
             <a:fld id="{48CF60FA-5391-42A7-ADB2-B9CD4F97321A}" type="datetimeFigureOut">
               <a:rPr lang="nl-NL" smtClean="0"/>
-              <a:t>13-9-2017</a:t>
+              <a:t>18-9-2017</a:t>
             </a:fld>
             <a:endParaRPr lang="nl-NL"/>
           </a:p>
@@ -1610,7 +1610,7 @@
           <a:p>
             <a:fld id="{48CF60FA-5391-42A7-ADB2-B9CD4F97321A}" type="datetimeFigureOut">
               <a:rPr lang="nl-NL" smtClean="0"/>
-              <a:t>13-9-2017</a:t>
+              <a:t>18-9-2017</a:t>
             </a:fld>
             <a:endParaRPr lang="nl-NL"/>
           </a:p>
@@ -1728,7 +1728,7 @@
           <a:p>
             <a:fld id="{48CF60FA-5391-42A7-ADB2-B9CD4F97321A}" type="datetimeFigureOut">
               <a:rPr lang="nl-NL" smtClean="0"/>
-              <a:t>13-9-2017</a:t>
+              <a:t>18-9-2017</a:t>
             </a:fld>
             <a:endParaRPr lang="nl-NL"/>
           </a:p>
@@ -1823,7 +1823,7 @@
           <a:p>
             <a:fld id="{48CF60FA-5391-42A7-ADB2-B9CD4F97321A}" type="datetimeFigureOut">
               <a:rPr lang="nl-NL" smtClean="0"/>
-              <a:t>13-9-2017</a:t>
+              <a:t>18-9-2017</a:t>
             </a:fld>
             <a:endParaRPr lang="nl-NL"/>
           </a:p>
@@ -2100,7 +2100,7 @@
           <a:p>
             <a:fld id="{48CF60FA-5391-42A7-ADB2-B9CD4F97321A}" type="datetimeFigureOut">
               <a:rPr lang="nl-NL" smtClean="0"/>
-              <a:t>13-9-2017</a:t>
+              <a:t>18-9-2017</a:t>
             </a:fld>
             <a:endParaRPr lang="nl-NL"/>
           </a:p>
@@ -2353,7 +2353,7 @@
           <a:p>
             <a:fld id="{48CF60FA-5391-42A7-ADB2-B9CD4F97321A}" type="datetimeFigureOut">
               <a:rPr lang="nl-NL" smtClean="0"/>
-              <a:t>13-9-2017</a:t>
+              <a:t>18-9-2017</a:t>
             </a:fld>
             <a:endParaRPr lang="nl-NL"/>
           </a:p>
@@ -2566,7 +2566,7 @@
           <a:p>
             <a:fld id="{48CF60FA-5391-42A7-ADB2-B9CD4F97321A}" type="datetimeFigureOut">
               <a:rPr lang="nl-NL" smtClean="0"/>
-              <a:t>13-9-2017</a:t>
+              <a:t>18-9-2017</a:t>
             </a:fld>
             <a:endParaRPr lang="nl-NL"/>
           </a:p>
@@ -4832,17 +4832,30 @@
           <a:p>
             <a:r>
               <a:rPr lang="en-US" dirty="0" smtClean="0"/>
-              <a:t>W,S,A,D for navigation</a:t>
-            </a:r>
-          </a:p>
-          <a:p>
+              <a:t>W,S,A,D for </a:t>
+            </a:r>
             <a:r>
               <a:rPr lang="en-US" dirty="0" smtClean="0"/>
-              <a:t>Left Right, for changing </a:t>
-            </a:r>
+              <a:t>navigation</a:t>
+            </a:r>
+          </a:p>
+          <a:p>
+            <a:r>
+              <a:rPr lang="nl-NL" altLang="zh-CN" dirty="0" smtClean="0"/>
+              <a:t>V reset scale size</a:t>
+            </a:r>
+          </a:p>
+          <a:p>
+            <a:r>
+              <a:rPr lang="nl-NL" smtClean="0"/>
+              <a:t>Shift set color panel</a:t>
+            </a:r>
+            <a:endParaRPr lang="en-US" dirty="0" smtClean="0"/>
+          </a:p>
+          <a:p>
             <a:r>
               <a:rPr lang="en-US" dirty="0" smtClean="0"/>
-              <a:t>frame</a:t>
+              <a:t>Left Right, for changing frame</a:t>
             </a:r>
           </a:p>
           <a:p>

</xml_diff>

<commit_message>
Fix superpixel resizing drawing,and fix autoload image
</commit_message>
<xml_diff>
--- a/Structure.pptx
+++ b/Structure.pptx
@@ -245,7 +245,7 @@
           <a:p>
             <a:fld id="{48CF60FA-5391-42A7-ADB2-B9CD4F97321A}" type="datetimeFigureOut">
               <a:rPr lang="nl-NL" smtClean="0"/>
-              <a:t>18-9-2017</a:t>
+              <a:t>19-9-2017</a:t>
             </a:fld>
             <a:endParaRPr lang="nl-NL"/>
           </a:p>
@@ -415,7 +415,7 @@
           <a:p>
             <a:fld id="{48CF60FA-5391-42A7-ADB2-B9CD4F97321A}" type="datetimeFigureOut">
               <a:rPr lang="nl-NL" smtClean="0"/>
-              <a:t>18-9-2017</a:t>
+              <a:t>19-9-2017</a:t>
             </a:fld>
             <a:endParaRPr lang="nl-NL"/>
           </a:p>
@@ -595,7 +595,7 @@
           <a:p>
             <a:fld id="{48CF60FA-5391-42A7-ADB2-B9CD4F97321A}" type="datetimeFigureOut">
               <a:rPr lang="nl-NL" smtClean="0"/>
-              <a:t>18-9-2017</a:t>
+              <a:t>19-9-2017</a:t>
             </a:fld>
             <a:endParaRPr lang="nl-NL"/>
           </a:p>
@@ -765,7 +765,7 @@
           <a:p>
             <a:fld id="{48CF60FA-5391-42A7-ADB2-B9CD4F97321A}" type="datetimeFigureOut">
               <a:rPr lang="nl-NL" smtClean="0"/>
-              <a:t>18-9-2017</a:t>
+              <a:t>19-9-2017</a:t>
             </a:fld>
             <a:endParaRPr lang="nl-NL"/>
           </a:p>
@@ -1011,7 +1011,7 @@
           <a:p>
             <a:fld id="{48CF60FA-5391-42A7-ADB2-B9CD4F97321A}" type="datetimeFigureOut">
               <a:rPr lang="nl-NL" smtClean="0"/>
-              <a:t>18-9-2017</a:t>
+              <a:t>19-9-2017</a:t>
             </a:fld>
             <a:endParaRPr lang="nl-NL"/>
           </a:p>
@@ -1243,7 +1243,7 @@
           <a:p>
             <a:fld id="{48CF60FA-5391-42A7-ADB2-B9CD4F97321A}" type="datetimeFigureOut">
               <a:rPr lang="nl-NL" smtClean="0"/>
-              <a:t>18-9-2017</a:t>
+              <a:t>19-9-2017</a:t>
             </a:fld>
             <a:endParaRPr lang="nl-NL"/>
           </a:p>
@@ -1610,7 +1610,7 @@
           <a:p>
             <a:fld id="{48CF60FA-5391-42A7-ADB2-B9CD4F97321A}" type="datetimeFigureOut">
               <a:rPr lang="nl-NL" smtClean="0"/>
-              <a:t>18-9-2017</a:t>
+              <a:t>19-9-2017</a:t>
             </a:fld>
             <a:endParaRPr lang="nl-NL"/>
           </a:p>
@@ -1728,7 +1728,7 @@
           <a:p>
             <a:fld id="{48CF60FA-5391-42A7-ADB2-B9CD4F97321A}" type="datetimeFigureOut">
               <a:rPr lang="nl-NL" smtClean="0"/>
-              <a:t>18-9-2017</a:t>
+              <a:t>19-9-2017</a:t>
             </a:fld>
             <a:endParaRPr lang="nl-NL"/>
           </a:p>
@@ -1823,7 +1823,7 @@
           <a:p>
             <a:fld id="{48CF60FA-5391-42A7-ADB2-B9CD4F97321A}" type="datetimeFigureOut">
               <a:rPr lang="nl-NL" smtClean="0"/>
-              <a:t>18-9-2017</a:t>
+              <a:t>19-9-2017</a:t>
             </a:fld>
             <a:endParaRPr lang="nl-NL"/>
           </a:p>
@@ -2100,7 +2100,7 @@
           <a:p>
             <a:fld id="{48CF60FA-5391-42A7-ADB2-B9CD4F97321A}" type="datetimeFigureOut">
               <a:rPr lang="nl-NL" smtClean="0"/>
-              <a:t>18-9-2017</a:t>
+              <a:t>19-9-2017</a:t>
             </a:fld>
             <a:endParaRPr lang="nl-NL"/>
           </a:p>
@@ -2353,7 +2353,7 @@
           <a:p>
             <a:fld id="{48CF60FA-5391-42A7-ADB2-B9CD4F97321A}" type="datetimeFigureOut">
               <a:rPr lang="nl-NL" smtClean="0"/>
-              <a:t>18-9-2017</a:t>
+              <a:t>19-9-2017</a:t>
             </a:fld>
             <a:endParaRPr lang="nl-NL"/>
           </a:p>
@@ -2566,7 +2566,7 @@
           <a:p>
             <a:fld id="{48CF60FA-5391-42A7-ADB2-B9CD4F97321A}" type="datetimeFigureOut">
               <a:rPr lang="nl-NL" smtClean="0"/>
-              <a:t>18-9-2017</a:t>
+              <a:t>19-9-2017</a:t>
             </a:fld>
             <a:endParaRPr lang="nl-NL"/>
           </a:p>
@@ -4832,11 +4832,7 @@
           <a:p>
             <a:r>
               <a:rPr lang="en-US" dirty="0" smtClean="0"/>
-              <a:t>W,S,A,D for </a:t>
-            </a:r>
-            <a:r>
-              <a:rPr lang="en-US" dirty="0" smtClean="0"/>
-              <a:t>navigation</a:t>
+              <a:t>W,S,A,D for navigation</a:t>
             </a:r>
           </a:p>
           <a:p>
@@ -4847,7 +4843,7 @@
           </a:p>
           <a:p>
             <a:r>
-              <a:rPr lang="nl-NL" smtClean="0"/>
+              <a:rPr lang="nl-NL" dirty="0" smtClean="0"/>
               <a:t>Shift set color panel</a:t>
             </a:r>
             <a:endParaRPr lang="en-US" dirty="0" smtClean="0"/>
@@ -4855,7 +4851,19 @@
           <a:p>
             <a:r>
               <a:rPr lang="en-US" dirty="0" smtClean="0"/>
-              <a:t>Left Right, for changing frame</a:t>
+              <a:t>Left </a:t>
+            </a:r>
+            <a:r>
+              <a:rPr lang="nl-NL"/>
+              <a:t>,</a:t>
+            </a:r>
+            <a:r>
+              <a:rPr lang="en-US" smtClean="0"/>
+              <a:t>Right</a:t>
+            </a:r>
+            <a:r>
+              <a:rPr lang="en-US" dirty="0" smtClean="0"/>
+              <a:t>, for changing frame</a:t>
             </a:r>
           </a:p>
           <a:p>
@@ -4867,7 +4875,7 @@
               <a:rPr lang="en-US" dirty="0" smtClean="0"/>
               <a:t> </a:t>
             </a:r>
-            <a:endParaRPr lang="nl-NL" dirty="0"/>
+            <a:endParaRPr lang="en-US" dirty="0" smtClean="0"/>
           </a:p>
         </p:txBody>
       </p:sp>

</xml_diff>